<commit_message>
update the doc initial app
</commit_message>
<xml_diff>
--- a/Docs/Code Challenge.pptx
+++ b/Docs/Code Challenge.pptx
@@ -5,13 +5,15 @@
     <p:sldMasterId id="2147483660" r:id="rId1"/>
   </p:sldMasterIdLst>
   <p:notesMasterIdLst>
-    <p:notesMasterId r:id="rId6"/>
+    <p:notesMasterId r:id="rId8"/>
   </p:notesMasterIdLst>
   <p:sldIdLst>
     <p:sldId id="256" r:id="rId2"/>
     <p:sldId id="257" r:id="rId3"/>
     <p:sldId id="258" r:id="rId4"/>
-    <p:sldId id="259" r:id="rId5"/>
+    <p:sldId id="260" r:id="rId5"/>
+    <p:sldId id="261" r:id="rId6"/>
+    <p:sldId id="259" r:id="rId7"/>
   </p:sldIdLst>
   <p:sldSz cx="12192000" cy="6858000"/>
   <p:notesSz cx="6858000" cy="9144000"/>
@@ -4609,13 +4611,8 @@
             <a:pPr lvl="1"/>
             <a:r>
               <a:rPr lang="en-US" dirty="0"/>
-              <a:t>Soldier movements on map (final) (approx. </a:t>
-            </a:r>
-            <a:r>
-              <a:rPr lang="en-US"/>
-              <a:t>30mins)</a:t>
-            </a:r>
-            <a:endParaRPr lang="en-US" dirty="0"/>
+              <a:t>Soldier movements on map (final) (approx. 30mins)</a:t>
+            </a:r>
           </a:p>
           <a:p>
             <a:pPr lvl="2"/>
@@ -4697,7 +4694,7 @@
           <p:cNvPr id="2" name="Title 1">
             <a:extLst>
               <a:ext uri="{FF2B5EF4-FFF2-40B4-BE49-F238E27FC236}">
-                <a16:creationId xmlns:a16="http://schemas.microsoft.com/office/drawing/2014/main" id="{F2882481-0B6C-4A52-6485-C0C0F84834B9}"/>
+                <a16:creationId xmlns:a16="http://schemas.microsoft.com/office/drawing/2014/main" id="{D5D4B67A-294C-4B86-D70C-87CFF8AB622A}"/>
               </a:ext>
             </a:extLst>
           </p:cNvPr>
@@ -4713,24 +4710,659 @@
           <a:bodyPr/>
           <a:lstStyle/>
           <a:p>
-            <a:endParaRPr lang="en-IN"/>
-          </a:p>
-        </p:txBody>
-      </p:sp>
-      <p:sp>
-        <p:nvSpPr>
-          <p:cNvPr id="3" name="Content Placeholder 2">
+            <a:r>
+              <a:rPr lang="en-US" dirty="0"/>
+              <a:t>Architecture </a:t>
+            </a:r>
+            <a:endParaRPr lang="en-IN" dirty="0"/>
+          </a:p>
+        </p:txBody>
+      </p:sp>
+      <p:sp>
+        <p:nvSpPr>
+          <p:cNvPr id="4" name="Rectangle 3">
             <a:extLst>
               <a:ext uri="{FF2B5EF4-FFF2-40B4-BE49-F238E27FC236}">
-                <a16:creationId xmlns:a16="http://schemas.microsoft.com/office/drawing/2014/main" id="{6CA0B144-BFB8-E84D-EADE-1AD1488D3BD8}"/>
+                <a16:creationId xmlns:a16="http://schemas.microsoft.com/office/drawing/2014/main" id="{ECE627F6-3E8C-C735-C3E9-3B5BF7E52BD1}"/>
               </a:ext>
             </a:extLst>
           </p:cNvPr>
-          <p:cNvSpPr>
-            <a:spLocks noGrp="1"/>
-          </p:cNvSpPr>
-          <p:nvPr>
-            <p:ph idx="1"/>
+          <p:cNvSpPr/>
+          <p:nvPr/>
+        </p:nvSpPr>
+        <p:spPr>
+          <a:xfrm>
+            <a:off x="1785256" y="2523506"/>
+            <a:ext cx="1745673" cy="1229096"/>
+          </a:xfrm>
+          <a:prstGeom prst="rect">
+            <a:avLst/>
+          </a:prstGeom>
+        </p:spPr>
+        <p:style>
+          <a:lnRef idx="2">
+            <a:schemeClr val="accent6">
+              <a:shade val="15000"/>
+            </a:schemeClr>
+          </a:lnRef>
+          <a:fillRef idx="1">
+            <a:schemeClr val="accent6"/>
+          </a:fillRef>
+          <a:effectRef idx="0">
+            <a:schemeClr val="accent6"/>
+          </a:effectRef>
+          <a:fontRef idx="minor">
+            <a:schemeClr val="lt1"/>
+          </a:fontRef>
+        </p:style>
+        <p:txBody>
+          <a:bodyPr rtlCol="0" anchor="ctr"/>
+          <a:lstStyle/>
+          <a:p>
+            <a:pPr algn="ctr"/>
+            <a:r>
+              <a:rPr lang="en-US" dirty="0"/>
+              <a:t>Map</a:t>
+            </a:r>
+            <a:endParaRPr lang="en-IN" dirty="0"/>
+          </a:p>
+        </p:txBody>
+      </p:sp>
+      <p:sp>
+        <p:nvSpPr>
+          <p:cNvPr id="6" name="Rectangle 5">
+            <a:extLst>
+              <a:ext uri="{FF2B5EF4-FFF2-40B4-BE49-F238E27FC236}">
+                <a16:creationId xmlns:a16="http://schemas.microsoft.com/office/drawing/2014/main" id="{36FBA01E-E85E-DCA2-74DF-2BA48860768E}"/>
+              </a:ext>
+            </a:extLst>
+          </p:cNvPr>
+          <p:cNvSpPr/>
+          <p:nvPr/>
+        </p:nvSpPr>
+        <p:spPr>
+          <a:xfrm>
+            <a:off x="4653148" y="2523507"/>
+            <a:ext cx="1745673" cy="1229096"/>
+          </a:xfrm>
+          <a:prstGeom prst="rect">
+            <a:avLst/>
+          </a:prstGeom>
+        </p:spPr>
+        <p:style>
+          <a:lnRef idx="2">
+            <a:schemeClr val="accent6">
+              <a:shade val="15000"/>
+            </a:schemeClr>
+          </a:lnRef>
+          <a:fillRef idx="1">
+            <a:schemeClr val="accent6"/>
+          </a:fillRef>
+          <a:effectRef idx="0">
+            <a:schemeClr val="accent6"/>
+          </a:effectRef>
+          <a:fontRef idx="minor">
+            <a:schemeClr val="lt1"/>
+          </a:fontRef>
+        </p:style>
+        <p:txBody>
+          <a:bodyPr rtlCol="0" anchor="t"/>
+          <a:lstStyle/>
+          <a:p>
+            <a:pPr algn="ctr"/>
+            <a:r>
+              <a:rPr lang="en-US" dirty="0"/>
+              <a:t>Service Controller</a:t>
+            </a:r>
+            <a:endParaRPr lang="en-IN" dirty="0"/>
+          </a:p>
+        </p:txBody>
+      </p:sp>
+      <p:sp>
+        <p:nvSpPr>
+          <p:cNvPr id="7" name="Rectangle 6">
+            <a:extLst>
+              <a:ext uri="{FF2B5EF4-FFF2-40B4-BE49-F238E27FC236}">
+                <a16:creationId xmlns:a16="http://schemas.microsoft.com/office/drawing/2014/main" id="{952E6F70-4E86-5A9D-F142-DB13D1976248}"/>
+              </a:ext>
+            </a:extLst>
+          </p:cNvPr>
+          <p:cNvSpPr/>
+          <p:nvPr/>
+        </p:nvSpPr>
+        <p:spPr>
+          <a:xfrm>
+            <a:off x="7750034" y="2523506"/>
+            <a:ext cx="1745673" cy="1229096"/>
+          </a:xfrm>
+          <a:prstGeom prst="rect">
+            <a:avLst/>
+          </a:prstGeom>
+        </p:spPr>
+        <p:style>
+          <a:lnRef idx="2">
+            <a:schemeClr val="accent6">
+              <a:shade val="15000"/>
+            </a:schemeClr>
+          </a:lnRef>
+          <a:fillRef idx="1">
+            <a:schemeClr val="accent6"/>
+          </a:fillRef>
+          <a:effectRef idx="0">
+            <a:schemeClr val="accent6"/>
+          </a:effectRef>
+          <a:fontRef idx="minor">
+            <a:schemeClr val="lt1"/>
+          </a:fontRef>
+        </p:style>
+        <p:txBody>
+          <a:bodyPr rtlCol="0" anchor="ctr"/>
+          <a:lstStyle/>
+          <a:p>
+            <a:pPr algn="ctr"/>
+            <a:r>
+              <a:rPr lang="en-US" dirty="0"/>
+              <a:t>Data Store</a:t>
+            </a:r>
+            <a:endParaRPr lang="en-IN" dirty="0"/>
+          </a:p>
+        </p:txBody>
+      </p:sp>
+      <p:sp>
+        <p:nvSpPr>
+          <p:cNvPr id="8" name="Rectangle 7">
+            <a:extLst>
+              <a:ext uri="{FF2B5EF4-FFF2-40B4-BE49-F238E27FC236}">
+                <a16:creationId xmlns:a16="http://schemas.microsoft.com/office/drawing/2014/main" id="{281E5703-D4B8-C43E-8FC9-5039CFC6DBAA}"/>
+              </a:ext>
+            </a:extLst>
+          </p:cNvPr>
+          <p:cNvSpPr/>
+          <p:nvPr/>
+        </p:nvSpPr>
+        <p:spPr>
+          <a:xfrm>
+            <a:off x="5058888" y="4417621"/>
+            <a:ext cx="1169720" cy="368135"/>
+          </a:xfrm>
+          <a:prstGeom prst="rect">
+            <a:avLst/>
+          </a:prstGeom>
+        </p:spPr>
+        <p:style>
+          <a:lnRef idx="2">
+            <a:schemeClr val="accent1">
+              <a:shade val="15000"/>
+            </a:schemeClr>
+          </a:lnRef>
+          <a:fillRef idx="1">
+            <a:schemeClr val="accent1"/>
+          </a:fillRef>
+          <a:effectRef idx="0">
+            <a:schemeClr val="accent1"/>
+          </a:effectRef>
+          <a:fontRef idx="minor">
+            <a:schemeClr val="lt1"/>
+          </a:fontRef>
+        </p:style>
+        <p:txBody>
+          <a:bodyPr rtlCol="0" anchor="ctr"/>
+          <a:lstStyle/>
+          <a:p>
+            <a:pPr algn="ctr"/>
+            <a:r>
+              <a:rPr lang="en-US" dirty="0"/>
+              <a:t>Sensor</a:t>
+            </a:r>
+            <a:endParaRPr lang="en-IN" dirty="0"/>
+          </a:p>
+        </p:txBody>
+      </p:sp>
+      <p:cxnSp>
+        <p:nvCxnSpPr>
+          <p:cNvPr id="10" name="Straight Arrow Connector 9">
+            <a:extLst>
+              <a:ext uri="{FF2B5EF4-FFF2-40B4-BE49-F238E27FC236}">
+                <a16:creationId xmlns:a16="http://schemas.microsoft.com/office/drawing/2014/main" id="{6F150352-6FA1-4F1A-E378-9997136955AA}"/>
+              </a:ext>
+            </a:extLst>
+          </p:cNvPr>
+          <p:cNvCxnSpPr>
+            <a:cxnSpLocks/>
+            <a:stCxn id="8" idx="0"/>
+            <a:endCxn id="6" idx="2"/>
+          </p:cNvCxnSpPr>
+          <p:nvPr/>
+        </p:nvCxnSpPr>
+        <p:spPr>
+          <a:xfrm flipH="1" flipV="1">
+            <a:off x="5525985" y="3752603"/>
+            <a:ext cx="117763" cy="665018"/>
+          </a:xfrm>
+          <a:prstGeom prst="straightConnector1">
+            <a:avLst/>
+          </a:prstGeom>
+          <a:ln>
+            <a:tailEnd type="triangle"/>
+          </a:ln>
+        </p:spPr>
+        <p:style>
+          <a:lnRef idx="1">
+            <a:schemeClr val="accent1"/>
+          </a:lnRef>
+          <a:fillRef idx="0">
+            <a:schemeClr val="accent1"/>
+          </a:fillRef>
+          <a:effectRef idx="0">
+            <a:schemeClr val="accent1"/>
+          </a:effectRef>
+          <a:fontRef idx="minor">
+            <a:schemeClr val="tx1"/>
+          </a:fontRef>
+        </p:style>
+      </p:cxnSp>
+      <p:sp>
+        <p:nvSpPr>
+          <p:cNvPr id="12" name="Rectangle 11">
+            <a:extLst>
+              <a:ext uri="{FF2B5EF4-FFF2-40B4-BE49-F238E27FC236}">
+                <a16:creationId xmlns:a16="http://schemas.microsoft.com/office/drawing/2014/main" id="{13A2544B-E172-4EF2-863E-CC074D7415E8}"/>
+              </a:ext>
+            </a:extLst>
+          </p:cNvPr>
+          <p:cNvSpPr/>
+          <p:nvPr/>
+        </p:nvSpPr>
+        <p:spPr>
+          <a:xfrm>
+            <a:off x="5183579" y="3429000"/>
+            <a:ext cx="783772" cy="323603"/>
+          </a:xfrm>
+          <a:prstGeom prst="rect">
+            <a:avLst/>
+          </a:prstGeom>
+        </p:spPr>
+        <p:style>
+          <a:lnRef idx="2">
+            <a:schemeClr val="accent1">
+              <a:shade val="15000"/>
+            </a:schemeClr>
+          </a:lnRef>
+          <a:fillRef idx="1">
+            <a:schemeClr val="accent1"/>
+          </a:fillRef>
+          <a:effectRef idx="0">
+            <a:schemeClr val="accent1"/>
+          </a:effectRef>
+          <a:fontRef idx="minor">
+            <a:schemeClr val="lt1"/>
+          </a:fontRef>
+        </p:style>
+        <p:txBody>
+          <a:bodyPr rtlCol="0" anchor="ctr"/>
+          <a:lstStyle/>
+          <a:p>
+            <a:pPr algn="ctr"/>
+            <a:r>
+              <a:rPr lang="en-US" sz="1050" dirty="0"/>
+              <a:t>Data Cache</a:t>
+            </a:r>
+            <a:endParaRPr lang="en-IN" sz="1050" dirty="0"/>
+          </a:p>
+        </p:txBody>
+      </p:sp>
+      <p:sp>
+        <p:nvSpPr>
+          <p:cNvPr id="13" name="Rectangle 12">
+            <a:extLst>
+              <a:ext uri="{FF2B5EF4-FFF2-40B4-BE49-F238E27FC236}">
+                <a16:creationId xmlns:a16="http://schemas.microsoft.com/office/drawing/2014/main" id="{2E341218-6D24-0334-0140-ABFEE32C8BE2}"/>
+              </a:ext>
+            </a:extLst>
+          </p:cNvPr>
+          <p:cNvSpPr/>
+          <p:nvPr/>
+        </p:nvSpPr>
+        <p:spPr>
+          <a:xfrm>
+            <a:off x="6131626" y="2976253"/>
+            <a:ext cx="795052" cy="323603"/>
+          </a:xfrm>
+          <a:prstGeom prst="rect">
+            <a:avLst/>
+          </a:prstGeom>
+        </p:spPr>
+        <p:style>
+          <a:lnRef idx="2">
+            <a:schemeClr val="accent1">
+              <a:shade val="15000"/>
+            </a:schemeClr>
+          </a:lnRef>
+          <a:fillRef idx="1">
+            <a:schemeClr val="accent1"/>
+          </a:fillRef>
+          <a:effectRef idx="0">
+            <a:schemeClr val="accent1"/>
+          </a:effectRef>
+          <a:fontRef idx="minor">
+            <a:schemeClr val="lt1"/>
+          </a:fontRef>
+        </p:style>
+        <p:txBody>
+          <a:bodyPr rtlCol="0" anchor="ctr"/>
+          <a:lstStyle/>
+          <a:p>
+            <a:pPr algn="ctr"/>
+            <a:r>
+              <a:rPr lang="en-US" sz="900" dirty="0"/>
+              <a:t>Data Adapter</a:t>
+            </a:r>
+            <a:endParaRPr lang="en-IN" sz="900" dirty="0"/>
+          </a:p>
+        </p:txBody>
+      </p:sp>
+      <p:sp>
+        <p:nvSpPr>
+          <p:cNvPr id="14" name="Rectangle 13">
+            <a:extLst>
+              <a:ext uri="{FF2B5EF4-FFF2-40B4-BE49-F238E27FC236}">
+                <a16:creationId xmlns:a16="http://schemas.microsoft.com/office/drawing/2014/main" id="{E88E64AD-37D8-40EB-09EB-4C81843D5FB8}"/>
+              </a:ext>
+            </a:extLst>
+          </p:cNvPr>
+          <p:cNvSpPr/>
+          <p:nvPr/>
+        </p:nvSpPr>
+        <p:spPr>
+          <a:xfrm>
+            <a:off x="4136571" y="2979221"/>
+            <a:ext cx="783772" cy="323603"/>
+          </a:xfrm>
+          <a:prstGeom prst="rect">
+            <a:avLst/>
+          </a:prstGeom>
+        </p:spPr>
+        <p:style>
+          <a:lnRef idx="2">
+            <a:schemeClr val="accent1">
+              <a:shade val="15000"/>
+            </a:schemeClr>
+          </a:lnRef>
+          <a:fillRef idx="1">
+            <a:schemeClr val="accent1"/>
+          </a:fillRef>
+          <a:effectRef idx="0">
+            <a:schemeClr val="accent1"/>
+          </a:effectRef>
+          <a:fontRef idx="minor">
+            <a:schemeClr val="lt1"/>
+          </a:fontRef>
+        </p:style>
+        <p:txBody>
+          <a:bodyPr rtlCol="0" anchor="ctr"/>
+          <a:lstStyle/>
+          <a:p>
+            <a:pPr algn="ctr"/>
+            <a:r>
+              <a:rPr lang="en-US" sz="1050" dirty="0"/>
+              <a:t>Update</a:t>
+            </a:r>
+            <a:endParaRPr lang="en-IN" sz="1050" dirty="0"/>
+          </a:p>
+        </p:txBody>
+      </p:sp>
+      <p:cxnSp>
+        <p:nvCxnSpPr>
+          <p:cNvPr id="16" name="Straight Arrow Connector 15">
+            <a:extLst>
+              <a:ext uri="{FF2B5EF4-FFF2-40B4-BE49-F238E27FC236}">
+                <a16:creationId xmlns:a16="http://schemas.microsoft.com/office/drawing/2014/main" id="{E637EF73-CD38-EA96-E1A1-6CA86CE575AF}"/>
+              </a:ext>
+            </a:extLst>
+          </p:cNvPr>
+          <p:cNvCxnSpPr>
+            <a:cxnSpLocks/>
+            <a:stCxn id="12" idx="0"/>
+            <a:endCxn id="14" idx="3"/>
+          </p:cNvCxnSpPr>
+          <p:nvPr/>
+        </p:nvCxnSpPr>
+        <p:spPr>
+          <a:xfrm flipH="1" flipV="1">
+            <a:off x="4920343" y="3141023"/>
+            <a:ext cx="655122" cy="287977"/>
+          </a:xfrm>
+          <a:prstGeom prst="straightConnector1">
+            <a:avLst/>
+          </a:prstGeom>
+          <a:ln>
+            <a:tailEnd type="triangle"/>
+          </a:ln>
+        </p:spPr>
+        <p:style>
+          <a:lnRef idx="1">
+            <a:schemeClr val="dk1"/>
+          </a:lnRef>
+          <a:fillRef idx="0">
+            <a:schemeClr val="dk1"/>
+          </a:fillRef>
+          <a:effectRef idx="0">
+            <a:schemeClr val="dk1"/>
+          </a:effectRef>
+          <a:fontRef idx="minor">
+            <a:schemeClr val="tx1"/>
+          </a:fontRef>
+        </p:style>
+      </p:cxnSp>
+      <p:cxnSp>
+        <p:nvCxnSpPr>
+          <p:cNvPr id="18" name="Straight Arrow Connector 17">
+            <a:extLst>
+              <a:ext uri="{FF2B5EF4-FFF2-40B4-BE49-F238E27FC236}">
+                <a16:creationId xmlns:a16="http://schemas.microsoft.com/office/drawing/2014/main" id="{718EBA30-B66D-2718-B357-8CD120557968}"/>
+              </a:ext>
+            </a:extLst>
+          </p:cNvPr>
+          <p:cNvCxnSpPr>
+            <a:cxnSpLocks/>
+            <a:stCxn id="12" idx="0"/>
+            <a:endCxn id="13" idx="1"/>
+          </p:cNvCxnSpPr>
+          <p:nvPr/>
+        </p:nvCxnSpPr>
+        <p:spPr>
+          <a:xfrm flipV="1">
+            <a:off x="5575465" y="3138055"/>
+            <a:ext cx="556161" cy="290945"/>
+          </a:xfrm>
+          <a:prstGeom prst="straightConnector1">
+            <a:avLst/>
+          </a:prstGeom>
+          <a:ln>
+            <a:tailEnd type="triangle"/>
+          </a:ln>
+        </p:spPr>
+        <p:style>
+          <a:lnRef idx="1">
+            <a:schemeClr val="dk1"/>
+          </a:lnRef>
+          <a:fillRef idx="0">
+            <a:schemeClr val="dk1"/>
+          </a:fillRef>
+          <a:effectRef idx="0">
+            <a:schemeClr val="dk1"/>
+          </a:effectRef>
+          <a:fontRef idx="minor">
+            <a:schemeClr val="tx1"/>
+          </a:fontRef>
+        </p:style>
+      </p:cxnSp>
+      <p:cxnSp>
+        <p:nvCxnSpPr>
+          <p:cNvPr id="21" name="Straight Arrow Connector 20">
+            <a:extLst>
+              <a:ext uri="{FF2B5EF4-FFF2-40B4-BE49-F238E27FC236}">
+                <a16:creationId xmlns:a16="http://schemas.microsoft.com/office/drawing/2014/main" id="{3A84E03B-97F9-825C-04A5-D2DF31DEA1C8}"/>
+              </a:ext>
+            </a:extLst>
+          </p:cNvPr>
+          <p:cNvCxnSpPr>
+            <a:stCxn id="14" idx="1"/>
+            <a:endCxn id="4" idx="3"/>
+          </p:cNvCxnSpPr>
+          <p:nvPr/>
+        </p:nvCxnSpPr>
+        <p:spPr>
+          <a:xfrm flipH="1" flipV="1">
+            <a:off x="3530929" y="3138054"/>
+            <a:ext cx="605642" cy="2969"/>
+          </a:xfrm>
+          <a:prstGeom prst="straightConnector1">
+            <a:avLst/>
+          </a:prstGeom>
+          <a:ln>
+            <a:tailEnd type="triangle"/>
+          </a:ln>
+        </p:spPr>
+        <p:style>
+          <a:lnRef idx="1">
+            <a:schemeClr val="dk1"/>
+          </a:lnRef>
+          <a:fillRef idx="0">
+            <a:schemeClr val="dk1"/>
+          </a:fillRef>
+          <a:effectRef idx="0">
+            <a:schemeClr val="dk1"/>
+          </a:effectRef>
+          <a:fontRef idx="minor">
+            <a:schemeClr val="tx1"/>
+          </a:fontRef>
+        </p:style>
+      </p:cxnSp>
+      <p:cxnSp>
+        <p:nvCxnSpPr>
+          <p:cNvPr id="23" name="Straight Arrow Connector 22">
+            <a:extLst>
+              <a:ext uri="{FF2B5EF4-FFF2-40B4-BE49-F238E27FC236}">
+                <a16:creationId xmlns:a16="http://schemas.microsoft.com/office/drawing/2014/main" id="{8A4E1E3B-568A-9A61-6862-F47A06D93AE4}"/>
+              </a:ext>
+            </a:extLst>
+          </p:cNvPr>
+          <p:cNvCxnSpPr>
+            <a:cxnSpLocks/>
+            <a:stCxn id="13" idx="3"/>
+            <a:endCxn id="7" idx="1"/>
+          </p:cNvCxnSpPr>
+          <p:nvPr/>
+        </p:nvCxnSpPr>
+        <p:spPr>
+          <a:xfrm flipV="1">
+            <a:off x="6926678" y="3138054"/>
+            <a:ext cx="823356" cy="1"/>
+          </a:xfrm>
+          <a:prstGeom prst="straightConnector1">
+            <a:avLst/>
+          </a:prstGeom>
+          <a:ln>
+            <a:headEnd type="triangle" w="med" len="med"/>
+            <a:tailEnd type="triangle" w="med" len="med"/>
+          </a:ln>
+        </p:spPr>
+        <p:style>
+          <a:lnRef idx="1">
+            <a:schemeClr val="dk1"/>
+          </a:lnRef>
+          <a:fillRef idx="0">
+            <a:schemeClr val="dk1"/>
+          </a:fillRef>
+          <a:effectRef idx="0">
+            <a:schemeClr val="dk1"/>
+          </a:effectRef>
+          <a:fontRef idx="minor">
+            <a:schemeClr val="tx1"/>
+          </a:fontRef>
+        </p:style>
+      </p:cxnSp>
+      <p:sp>
+        <p:nvSpPr>
+          <p:cNvPr id="25" name="TextBox 24">
+            <a:extLst>
+              <a:ext uri="{FF2B5EF4-FFF2-40B4-BE49-F238E27FC236}">
+                <a16:creationId xmlns:a16="http://schemas.microsoft.com/office/drawing/2014/main" id="{4BC9341F-2B04-C299-FBA3-53A291B6B8C9}"/>
+              </a:ext>
+            </a:extLst>
+          </p:cNvPr>
+          <p:cNvSpPr txBox="1"/>
+          <p:nvPr/>
+        </p:nvSpPr>
+        <p:spPr>
+          <a:xfrm>
+            <a:off x="1858488" y="5379522"/>
+            <a:ext cx="8241476" cy="369332"/>
+          </a:xfrm>
+          <a:prstGeom prst="rect">
+            <a:avLst/>
+          </a:prstGeom>
+          <a:noFill/>
+        </p:spPr>
+        <p:txBody>
+          <a:bodyPr wrap="square" rtlCol="0">
+            <a:spAutoFit/>
+          </a:bodyPr>
+          <a:lstStyle/>
+          <a:p>
+            <a:r>
+              <a:rPr lang="en-US" dirty="0"/>
+              <a:t>Environment: Visual Studio 2022, WPF, MVVM, Entity Framework, MSSQL Server</a:t>
+            </a:r>
+            <a:endParaRPr lang="en-IN" dirty="0"/>
+          </a:p>
+        </p:txBody>
+      </p:sp>
+    </p:spTree>
+    <p:extLst>
+      <p:ext uri="{BB962C8B-B14F-4D97-AF65-F5344CB8AC3E}">
+        <p14:creationId xmlns:p14="http://schemas.microsoft.com/office/powerpoint/2010/main" val="2821143764"/>
+      </p:ext>
+    </p:extLst>
+  </p:cSld>
+  <p:clrMapOvr>
+    <a:masterClrMapping/>
+  </p:clrMapOvr>
+</p:sld>
+</file>
+
+<file path=ppt/slides/slide5.xml><?xml version="1.0" encoding="utf-8"?>
+<p:sld xmlns:a="http://schemas.openxmlformats.org/drawingml/2006/main" xmlns:r="http://schemas.openxmlformats.org/officeDocument/2006/relationships" xmlns:p="http://schemas.openxmlformats.org/presentationml/2006/main">
+  <p:cSld>
+    <p:spTree>
+      <p:nvGrpSpPr>
+        <p:cNvPr id="1" name=""/>
+        <p:cNvGrpSpPr/>
+        <p:nvPr/>
+      </p:nvGrpSpPr>
+      <p:grpSpPr>
+        <a:xfrm>
+          <a:off x="0" y="0"/>
+          <a:ext cx="0" cy="0"/>
+          <a:chOff x="0" y="0"/>
+          <a:chExt cx="0" cy="0"/>
+        </a:xfrm>
+      </p:grpSpPr>
+      <p:sp>
+        <p:nvSpPr>
+          <p:cNvPr id="2" name="Title 1">
+            <a:extLst>
+              <a:ext uri="{FF2B5EF4-FFF2-40B4-BE49-F238E27FC236}">
+                <a16:creationId xmlns:a16="http://schemas.microsoft.com/office/drawing/2014/main" id="{85F24CF9-CA51-E223-42B5-6397E23BD221}"/>
+              </a:ext>
+            </a:extLst>
+          </p:cNvPr>
+          <p:cNvSpPr>
+            <a:spLocks noGrp="1"/>
+          </p:cNvSpPr>
+          <p:nvPr>
+            <p:ph type="title"/>
           </p:nvPr>
         </p:nvSpPr>
         <p:spPr/>
@@ -4738,10 +5370,360 @@
           <a:bodyPr/>
           <a:lstStyle/>
           <a:p>
-            <a:endParaRPr lang="en-IN"/>
-          </a:p>
-        </p:txBody>
-      </p:sp>
+            <a:r>
+              <a:rPr lang="en-US" dirty="0"/>
+              <a:t>Architecture Data Store : Basic</a:t>
+            </a:r>
+            <a:endParaRPr lang="en-IN" dirty="0"/>
+          </a:p>
+        </p:txBody>
+      </p:sp>
+      <p:sp>
+        <p:nvSpPr>
+          <p:cNvPr id="4" name="Rectangle 3">
+            <a:extLst>
+              <a:ext uri="{FF2B5EF4-FFF2-40B4-BE49-F238E27FC236}">
+                <a16:creationId xmlns:a16="http://schemas.microsoft.com/office/drawing/2014/main" id="{5F1C34CE-E54B-1EF7-B57E-E1B2521A4B1A}"/>
+              </a:ext>
+            </a:extLst>
+          </p:cNvPr>
+          <p:cNvSpPr/>
+          <p:nvPr/>
+        </p:nvSpPr>
+        <p:spPr>
+          <a:xfrm>
+            <a:off x="1490354" y="2339439"/>
+            <a:ext cx="2574966" cy="1888175"/>
+          </a:xfrm>
+          <a:prstGeom prst="rect">
+            <a:avLst/>
+          </a:prstGeom>
+        </p:spPr>
+        <p:style>
+          <a:lnRef idx="2">
+            <a:schemeClr val="accent6">
+              <a:shade val="15000"/>
+            </a:schemeClr>
+          </a:lnRef>
+          <a:fillRef idx="1">
+            <a:schemeClr val="accent6"/>
+          </a:fillRef>
+          <a:effectRef idx="0">
+            <a:schemeClr val="accent6"/>
+          </a:effectRef>
+          <a:fontRef idx="minor">
+            <a:schemeClr val="lt1"/>
+          </a:fontRef>
+        </p:style>
+        <p:txBody>
+          <a:bodyPr rtlCol="0" anchor="t"/>
+          <a:lstStyle/>
+          <a:p>
+            <a:pPr algn="ctr"/>
+            <a:r>
+              <a:rPr lang="en-US" dirty="0"/>
+              <a:t>Soldier </a:t>
+            </a:r>
+            <a:endParaRPr lang="en-IN" dirty="0"/>
+          </a:p>
+        </p:txBody>
+      </p:sp>
+      <p:sp>
+        <p:nvSpPr>
+          <p:cNvPr id="5" name="Rectangle 4">
+            <a:extLst>
+              <a:ext uri="{FF2B5EF4-FFF2-40B4-BE49-F238E27FC236}">
+                <a16:creationId xmlns:a16="http://schemas.microsoft.com/office/drawing/2014/main" id="{C0814048-3A9F-AB05-3DA4-41A97C8E5FB5}"/>
+              </a:ext>
+            </a:extLst>
+          </p:cNvPr>
+          <p:cNvSpPr/>
+          <p:nvPr/>
+        </p:nvSpPr>
+        <p:spPr>
+          <a:xfrm>
+            <a:off x="5386845" y="2339438"/>
+            <a:ext cx="2308366" cy="1888176"/>
+          </a:xfrm>
+          <a:prstGeom prst="rect">
+            <a:avLst/>
+          </a:prstGeom>
+        </p:spPr>
+        <p:style>
+          <a:lnRef idx="2">
+            <a:schemeClr val="accent6">
+              <a:shade val="15000"/>
+            </a:schemeClr>
+          </a:lnRef>
+          <a:fillRef idx="1">
+            <a:schemeClr val="accent6"/>
+          </a:fillRef>
+          <a:effectRef idx="0">
+            <a:schemeClr val="accent6"/>
+          </a:effectRef>
+          <a:fontRef idx="minor">
+            <a:schemeClr val="lt1"/>
+          </a:fontRef>
+        </p:style>
+        <p:txBody>
+          <a:bodyPr rtlCol="0" anchor="t"/>
+          <a:lstStyle/>
+          <a:p>
+            <a:pPr algn="ctr"/>
+            <a:r>
+              <a:rPr lang="en-US" dirty="0"/>
+              <a:t>Movements</a:t>
+            </a:r>
+            <a:endParaRPr lang="en-IN" dirty="0"/>
+          </a:p>
+        </p:txBody>
+      </p:sp>
+      <p:sp>
+        <p:nvSpPr>
+          <p:cNvPr id="6" name="TextBox 5">
+            <a:extLst>
+              <a:ext uri="{FF2B5EF4-FFF2-40B4-BE49-F238E27FC236}">
+                <a16:creationId xmlns:a16="http://schemas.microsoft.com/office/drawing/2014/main" id="{7F26F44B-9F86-975F-1E81-FAA92FC2AB91}"/>
+              </a:ext>
+            </a:extLst>
+          </p:cNvPr>
+          <p:cNvSpPr txBox="1"/>
+          <p:nvPr/>
+        </p:nvSpPr>
+        <p:spPr>
+          <a:xfrm>
+            <a:off x="1816924" y="2707575"/>
+            <a:ext cx="1674421" cy="923330"/>
+          </a:xfrm>
+          <a:prstGeom prst="rect">
+            <a:avLst/>
+          </a:prstGeom>
+          <a:noFill/>
+        </p:spPr>
+        <p:txBody>
+          <a:bodyPr wrap="square" rtlCol="0">
+            <a:spAutoFit/>
+          </a:bodyPr>
+          <a:lstStyle/>
+          <a:p>
+            <a:pPr marL="285750" indent="-285750">
+              <a:buFont typeface="Arial" panose="020B0604020202020204" pitchFamily="34" charset="0"/>
+              <a:buChar char="•"/>
+            </a:pPr>
+            <a:r>
+              <a:rPr lang="en-US" dirty="0"/>
+              <a:t>ID</a:t>
+            </a:r>
+          </a:p>
+          <a:p>
+            <a:pPr marL="285750" indent="-285750">
+              <a:buFont typeface="Arial" panose="020B0604020202020204" pitchFamily="34" charset="0"/>
+              <a:buChar char="•"/>
+            </a:pPr>
+            <a:r>
+              <a:rPr lang="en-US" dirty="0"/>
+              <a:t>Name</a:t>
+            </a:r>
+          </a:p>
+          <a:p>
+            <a:pPr marL="285750" indent="-285750">
+              <a:buFont typeface="Arial" panose="020B0604020202020204" pitchFamily="34" charset="0"/>
+              <a:buChar char="•"/>
+            </a:pPr>
+            <a:r>
+              <a:rPr lang="en-US" dirty="0"/>
+              <a:t>Rank</a:t>
+            </a:r>
+          </a:p>
+        </p:txBody>
+      </p:sp>
+      <p:sp>
+        <p:nvSpPr>
+          <p:cNvPr id="7" name="TextBox 6">
+            <a:extLst>
+              <a:ext uri="{FF2B5EF4-FFF2-40B4-BE49-F238E27FC236}">
+                <a16:creationId xmlns:a16="http://schemas.microsoft.com/office/drawing/2014/main" id="{584F61BD-2423-F607-82D4-BC90C5D64A1C}"/>
+              </a:ext>
+            </a:extLst>
+          </p:cNvPr>
+          <p:cNvSpPr txBox="1"/>
+          <p:nvPr/>
+        </p:nvSpPr>
+        <p:spPr>
+          <a:xfrm>
+            <a:off x="5440283" y="2654596"/>
+            <a:ext cx="1674421" cy="1477328"/>
+          </a:xfrm>
+          <a:prstGeom prst="rect">
+            <a:avLst/>
+          </a:prstGeom>
+          <a:noFill/>
+        </p:spPr>
+        <p:txBody>
+          <a:bodyPr wrap="square" rtlCol="0">
+            <a:spAutoFit/>
+          </a:bodyPr>
+          <a:lstStyle/>
+          <a:p>
+            <a:pPr marL="285750" indent="-285750">
+              <a:buFont typeface="Arial" panose="020B0604020202020204" pitchFamily="34" charset="0"/>
+              <a:buChar char="•"/>
+            </a:pPr>
+            <a:r>
+              <a:rPr lang="en-US" dirty="0"/>
+              <a:t>ID</a:t>
+            </a:r>
+          </a:p>
+          <a:p>
+            <a:pPr marL="285750" indent="-285750">
+              <a:buFont typeface="Arial" panose="020B0604020202020204" pitchFamily="34" charset="0"/>
+              <a:buChar char="•"/>
+            </a:pPr>
+            <a:r>
+              <a:rPr lang="en-US" dirty="0"/>
+              <a:t>Soldier ID</a:t>
+            </a:r>
+          </a:p>
+          <a:p>
+            <a:pPr marL="285750" indent="-285750">
+              <a:buFont typeface="Arial" panose="020B0604020202020204" pitchFamily="34" charset="0"/>
+              <a:buChar char="•"/>
+            </a:pPr>
+            <a:r>
+              <a:rPr lang="en-IN" dirty="0"/>
+              <a:t>Latitude</a:t>
+            </a:r>
+          </a:p>
+          <a:p>
+            <a:pPr marL="285750" indent="-285750">
+              <a:buFont typeface="Arial" panose="020B0604020202020204" pitchFamily="34" charset="0"/>
+              <a:buChar char="•"/>
+            </a:pPr>
+            <a:r>
+              <a:rPr lang="en-IN" dirty="0"/>
+              <a:t>Longitude</a:t>
+            </a:r>
+          </a:p>
+          <a:p>
+            <a:pPr marL="285750" indent="-285750">
+              <a:buFont typeface="Arial" panose="020B0604020202020204" pitchFamily="34" charset="0"/>
+              <a:buChar char="•"/>
+            </a:pPr>
+            <a:r>
+              <a:rPr lang="en-IN" dirty="0"/>
+              <a:t>Altitude</a:t>
+            </a:r>
+          </a:p>
+        </p:txBody>
+      </p:sp>
+      <p:cxnSp>
+        <p:nvCxnSpPr>
+          <p:cNvPr id="9" name="Straight Arrow Connector 8">
+            <a:extLst>
+              <a:ext uri="{FF2B5EF4-FFF2-40B4-BE49-F238E27FC236}">
+                <a16:creationId xmlns:a16="http://schemas.microsoft.com/office/drawing/2014/main" id="{656C3FE5-EB48-6B61-1737-52B978028E8D}"/>
+              </a:ext>
+            </a:extLst>
+          </p:cNvPr>
+          <p:cNvCxnSpPr>
+            <a:stCxn id="4" idx="3"/>
+            <a:endCxn id="5" idx="1"/>
+          </p:cNvCxnSpPr>
+          <p:nvPr/>
+        </p:nvCxnSpPr>
+        <p:spPr>
+          <a:xfrm flipV="1">
+            <a:off x="4065320" y="3283526"/>
+            <a:ext cx="1278576" cy="1"/>
+          </a:xfrm>
+          <a:prstGeom prst="straightConnector1">
+            <a:avLst/>
+          </a:prstGeom>
+          <a:ln>
+            <a:tailEnd type="triangle"/>
+          </a:ln>
+        </p:spPr>
+        <p:style>
+          <a:lnRef idx="1">
+            <a:schemeClr val="accent1"/>
+          </a:lnRef>
+          <a:fillRef idx="0">
+            <a:schemeClr val="accent1"/>
+          </a:fillRef>
+          <a:effectRef idx="0">
+            <a:schemeClr val="accent1"/>
+          </a:effectRef>
+          <a:fontRef idx="minor">
+            <a:schemeClr val="tx1"/>
+          </a:fontRef>
+        </p:style>
+      </p:cxnSp>
+      <p:sp>
+        <p:nvSpPr>
+          <p:cNvPr id="10" name="TextBox 9">
+            <a:extLst>
+              <a:ext uri="{FF2B5EF4-FFF2-40B4-BE49-F238E27FC236}">
+                <a16:creationId xmlns:a16="http://schemas.microsoft.com/office/drawing/2014/main" id="{D30A92FA-A482-1CDF-C23E-8A62EC9D4876}"/>
+              </a:ext>
+            </a:extLst>
+          </p:cNvPr>
+          <p:cNvSpPr txBox="1"/>
+          <p:nvPr/>
+        </p:nvSpPr>
+        <p:spPr>
+          <a:xfrm>
+            <a:off x="5097252" y="3023928"/>
+            <a:ext cx="300082" cy="369332"/>
+          </a:xfrm>
+          <a:prstGeom prst="rect">
+            <a:avLst/>
+          </a:prstGeom>
+          <a:noFill/>
+        </p:spPr>
+        <p:txBody>
+          <a:bodyPr wrap="none" rtlCol="0">
+            <a:spAutoFit/>
+          </a:bodyPr>
+          <a:lstStyle/>
+          <a:p>
+            <a:r>
+              <a:rPr lang="en-US" dirty="0"/>
+              <a:t>*</a:t>
+            </a:r>
+            <a:endParaRPr lang="en-IN" dirty="0"/>
+          </a:p>
+        </p:txBody>
+      </p:sp>
+    </p:spTree>
+    <p:extLst>
+      <p:ext uri="{BB962C8B-B14F-4D97-AF65-F5344CB8AC3E}">
+        <p14:creationId xmlns:p14="http://schemas.microsoft.com/office/powerpoint/2010/main" val="93582865"/>
+      </p:ext>
+    </p:extLst>
+  </p:cSld>
+  <p:clrMapOvr>
+    <a:masterClrMapping/>
+  </p:clrMapOvr>
+</p:sld>
+</file>
+
+<file path=ppt/slides/slide6.xml><?xml version="1.0" encoding="utf-8"?>
+<p:sld xmlns:a="http://schemas.openxmlformats.org/drawingml/2006/main" xmlns:r="http://schemas.openxmlformats.org/officeDocument/2006/relationships" xmlns:p="http://schemas.openxmlformats.org/presentationml/2006/main">
+  <p:cSld>
+    <p:spTree>
+      <p:nvGrpSpPr>
+        <p:cNvPr id="1" name=""/>
+        <p:cNvGrpSpPr/>
+        <p:nvPr/>
+      </p:nvGrpSpPr>
+      <p:grpSpPr>
+        <a:xfrm>
+          <a:off x="0" y="0"/>
+          <a:ext cx="0" cy="0"/>
+          <a:chOff x="0" y="0"/>
+          <a:chExt cx="0" cy="0"/>
+        </a:xfrm>
+      </p:grpSpPr>
       <p:sp>
         <p:nvSpPr>
           <p:cNvPr id="4" name="Slide Number Placeholder 3">
@@ -4765,9 +5747,290 @@
           <a:p>
             <a:fld id="{485A9664-C04A-438C-976D-1F037B1C7DF3}" type="slidenum">
               <a:rPr lang="en-IN" smtClean="0"/>
-              <a:t>4</a:t>
+              <a:t>6</a:t>
             </a:fld>
             <a:endParaRPr lang="en-IN"/>
+          </a:p>
+        </p:txBody>
+      </p:sp>
+      <p:pic>
+        <p:nvPicPr>
+          <p:cNvPr id="8" name="Picture 7" descr="Ähnliches Foto">
+            <a:hlinkClick r:id="rId2"/>
+            <a:extLst>
+              <a:ext uri="{FF2B5EF4-FFF2-40B4-BE49-F238E27FC236}">
+                <a16:creationId xmlns:a16="http://schemas.microsoft.com/office/drawing/2014/main" id="{751DD05B-593B-6F92-F4F4-E3504107CCF0}"/>
+              </a:ext>
+            </a:extLst>
+          </p:cNvPr>
+          <p:cNvPicPr>
+            <a:picLocks noChangeAspect="1" noChangeArrowheads="1"/>
+          </p:cNvPicPr>
+          <p:nvPr/>
+        </p:nvPicPr>
+        <p:blipFill>
+          <a:blip r:embed="rId3">
+            <a:extLst>
+              <a:ext uri="{28A0092B-C50C-407E-A947-70E740481C1C}">
+                <a14:useLocalDpi xmlns:a14="http://schemas.microsoft.com/office/drawing/2010/main" val="0"/>
+              </a:ext>
+            </a:extLst>
+          </a:blip>
+          <a:srcRect/>
+          <a:stretch>
+            <a:fillRect/>
+          </a:stretch>
+        </p:blipFill>
+        <p:spPr bwMode="auto">
+          <a:xfrm>
+            <a:off x="5776702" y="2445590"/>
+            <a:ext cx="2192288" cy="2192289"/>
+          </a:xfrm>
+          <a:prstGeom prst="rect">
+            <a:avLst/>
+          </a:prstGeom>
+          <a:noFill/>
+          <a:extLst>
+            <a:ext uri="{909E8E84-426E-40DD-AFC4-6F175D3DCCD1}">
+              <a14:hiddenFill xmlns:a14="http://schemas.microsoft.com/office/drawing/2010/main">
+                <a:solidFill>
+                  <a:srgbClr val="FFFFFF"/>
+                </a:solidFill>
+              </a14:hiddenFill>
+            </a:ext>
+          </a:extLst>
+        </p:spPr>
+      </p:pic>
+      <p:sp>
+        <p:nvSpPr>
+          <p:cNvPr id="9" name="Textplatzhalter 1">
+            <a:extLst>
+              <a:ext uri="{FF2B5EF4-FFF2-40B4-BE49-F238E27FC236}">
+                <a16:creationId xmlns:a16="http://schemas.microsoft.com/office/drawing/2014/main" id="{52F4919B-4608-F46C-5535-C040909BA8D3}"/>
+              </a:ext>
+            </a:extLst>
+          </p:cNvPr>
+          <p:cNvSpPr>
+            <a:spLocks noGrp="1"/>
+          </p:cNvSpPr>
+          <p:nvPr/>
+        </p:nvSpPr>
+        <p:spPr bwMode="auto">
+          <a:xfrm>
+            <a:off x="1885714" y="2194595"/>
+            <a:ext cx="4788024" cy="2944800"/>
+          </a:xfrm>
+          <a:prstGeom prst="rect">
+            <a:avLst/>
+          </a:prstGeom>
+          <a:noFill/>
+          <a:ln>
+            <a:noFill/>
+          </a:ln>
+          <a:extLst>
+            <a:ext uri="{909E8E84-426E-40DD-AFC4-6F175D3DCCD1}">
+              <a14:hiddenFill xmlns:a14="http://schemas.microsoft.com/office/drawing/2010/main">
+                <a:solidFill>
+                  <a:srgbClr val="FFFFFF"/>
+                </a:solidFill>
+              </a14:hiddenFill>
+            </a:ext>
+            <a:ext uri="{91240B29-F687-4F45-9708-019B960494DF}">
+              <a14:hiddenLine xmlns:a14="http://schemas.microsoft.com/office/drawing/2010/main" w="9525">
+                <a:solidFill>
+                  <a:srgbClr val="000000"/>
+                </a:solidFill>
+                <a:miter lim="800000"/>
+                <a:headEnd/>
+                <a:tailEnd/>
+              </a14:hiddenLine>
+            </a:ext>
+          </a:extLst>
+        </p:spPr>
+        <p:txBody>
+          <a:bodyPr vert="horz" wrap="square" lIns="0" tIns="0" rIns="0" bIns="0" numCol="1" anchor="ctr" anchorCtr="1" compatLnSpc="1">
+            <a:prstTxWarp prst="textNoShape">
+              <a:avLst/>
+            </a:prstTxWarp>
+          </a:bodyPr>
+          <a:lstStyle>
+            <a:lvl1pPr marL="0" indent="0" algn="l" rtl="0" eaLnBrk="1" fontAlgn="base" hangingPunct="1">
+              <a:spcBef>
+                <a:spcPct val="20000"/>
+              </a:spcBef>
+              <a:spcAft>
+                <a:spcPct val="0"/>
+              </a:spcAft>
+              <a:buFont typeface="Zapf Dingbats" charset="2"/>
+              <a:buNone/>
+              <a:defRPr sz="2400">
+                <a:solidFill>
+                  <a:schemeClr val="tx1"/>
+                </a:solidFill>
+                <a:latin typeface="Arial" charset="0"/>
+                <a:ea typeface="ＭＳ Ｐゴシック" charset="0"/>
+                <a:cs typeface="+mn-cs"/>
+              </a:defRPr>
+            </a:lvl1pPr>
+            <a:lvl2pPr marL="742950" indent="-285750" algn="l" rtl="0" eaLnBrk="1" fontAlgn="base" hangingPunct="1">
+              <a:spcBef>
+                <a:spcPct val="20000"/>
+              </a:spcBef>
+              <a:spcAft>
+                <a:spcPct val="0"/>
+              </a:spcAft>
+              <a:buFont typeface="Zapf Dingbats" charset="2"/>
+              <a:buChar char=""/>
+              <a:defRPr>
+                <a:solidFill>
+                  <a:schemeClr val="tx1"/>
+                </a:solidFill>
+                <a:latin typeface="Arial" charset="0"/>
+                <a:ea typeface="ＭＳ Ｐゴシック" pitchFamily="34" charset="-128"/>
+                <a:cs typeface="+mn-cs"/>
+              </a:defRPr>
+            </a:lvl2pPr>
+            <a:lvl3pPr marL="1143000" indent="-228600" algn="l" rtl="0" eaLnBrk="1" fontAlgn="base" hangingPunct="1">
+              <a:spcBef>
+                <a:spcPct val="20000"/>
+              </a:spcBef>
+              <a:spcAft>
+                <a:spcPct val="0"/>
+              </a:spcAft>
+              <a:buFont typeface="Zapf Dingbats" charset="2"/>
+              <a:buChar char=""/>
+              <a:defRPr sz="1600">
+                <a:solidFill>
+                  <a:schemeClr val="tx1"/>
+                </a:solidFill>
+                <a:latin typeface="Arial" charset="0"/>
+                <a:ea typeface="ＭＳ Ｐゴシック" pitchFamily="34" charset="-128"/>
+                <a:cs typeface="+mn-cs"/>
+              </a:defRPr>
+            </a:lvl3pPr>
+            <a:lvl4pPr marL="1600200" indent="-228600" algn="l" rtl="0" eaLnBrk="1" fontAlgn="base" hangingPunct="1">
+              <a:spcBef>
+                <a:spcPct val="20000"/>
+              </a:spcBef>
+              <a:spcAft>
+                <a:spcPct val="0"/>
+              </a:spcAft>
+              <a:buFont typeface="Zapf Dingbats" charset="2"/>
+              <a:buChar char=""/>
+              <a:defRPr sz="1600">
+                <a:solidFill>
+                  <a:schemeClr val="tx1"/>
+                </a:solidFill>
+                <a:latin typeface="Arial" charset="0"/>
+                <a:ea typeface="ＭＳ Ｐゴシック" pitchFamily="34" charset="-128"/>
+                <a:cs typeface="+mn-cs"/>
+              </a:defRPr>
+            </a:lvl4pPr>
+            <a:lvl5pPr marL="2057400" indent="-228600" algn="l" rtl="0" eaLnBrk="1" fontAlgn="base" hangingPunct="1">
+              <a:spcBef>
+                <a:spcPct val="20000"/>
+              </a:spcBef>
+              <a:spcAft>
+                <a:spcPct val="0"/>
+              </a:spcAft>
+              <a:buFont typeface="Zapf Dingbats" charset="2"/>
+              <a:buChar char=""/>
+              <a:defRPr sz="1600">
+                <a:solidFill>
+                  <a:schemeClr val="tx1"/>
+                </a:solidFill>
+                <a:latin typeface="Arial" charset="0"/>
+                <a:ea typeface="ＭＳ Ｐゴシック" pitchFamily="34" charset="-128"/>
+                <a:cs typeface="+mn-cs"/>
+              </a:defRPr>
+            </a:lvl5pPr>
+            <a:lvl6pPr marL="2514600" indent="-228600" algn="l" rtl="0" eaLnBrk="1" fontAlgn="base" hangingPunct="1">
+              <a:spcBef>
+                <a:spcPct val="20000"/>
+              </a:spcBef>
+              <a:spcAft>
+                <a:spcPct val="0"/>
+              </a:spcAft>
+              <a:buChar char="-"/>
+              <a:defRPr>
+                <a:solidFill>
+                  <a:schemeClr val="tx1"/>
+                </a:solidFill>
+                <a:latin typeface="+mn-lt"/>
+              </a:defRPr>
+            </a:lvl6pPr>
+            <a:lvl7pPr marL="2971800" indent="-228600" algn="l" rtl="0" eaLnBrk="1" fontAlgn="base" hangingPunct="1">
+              <a:spcBef>
+                <a:spcPct val="20000"/>
+              </a:spcBef>
+              <a:spcAft>
+                <a:spcPct val="0"/>
+              </a:spcAft>
+              <a:buChar char="-"/>
+              <a:defRPr>
+                <a:solidFill>
+                  <a:schemeClr val="tx1"/>
+                </a:solidFill>
+                <a:latin typeface="+mn-lt"/>
+              </a:defRPr>
+            </a:lvl7pPr>
+            <a:lvl8pPr marL="3429000" indent="-228600" algn="l" rtl="0" eaLnBrk="1" fontAlgn="base" hangingPunct="1">
+              <a:spcBef>
+                <a:spcPct val="20000"/>
+              </a:spcBef>
+              <a:spcAft>
+                <a:spcPct val="0"/>
+              </a:spcAft>
+              <a:buChar char="-"/>
+              <a:defRPr>
+                <a:solidFill>
+                  <a:schemeClr val="tx1"/>
+                </a:solidFill>
+                <a:latin typeface="+mn-lt"/>
+              </a:defRPr>
+            </a:lvl8pPr>
+            <a:lvl9pPr marL="3886200" indent="-228600" algn="l" rtl="0" eaLnBrk="1" fontAlgn="base" hangingPunct="1">
+              <a:spcBef>
+                <a:spcPct val="20000"/>
+              </a:spcBef>
+              <a:spcAft>
+                <a:spcPct val="0"/>
+              </a:spcAft>
+              <a:buChar char="-"/>
+              <a:defRPr>
+                <a:solidFill>
+                  <a:schemeClr val="tx1"/>
+                </a:solidFill>
+                <a:latin typeface="+mn-lt"/>
+              </a:defRPr>
+            </a:lvl9pPr>
+          </a:lstStyle>
+          <a:p>
+            <a:r>
+              <a:rPr lang="de-CH" dirty="0"/>
+              <a:t>Questions</a:t>
+            </a:r>
+          </a:p>
+          <a:p>
+            <a:endParaRPr lang="de-CH" dirty="0"/>
+          </a:p>
+          <a:p>
+            <a:r>
+              <a:rPr lang="de-CH" dirty="0"/>
+              <a:t>       &amp;</a:t>
+            </a:r>
+          </a:p>
+          <a:p>
+            <a:endParaRPr lang="de-CH" dirty="0"/>
+          </a:p>
+          <a:p>
+            <a:r>
+              <a:rPr lang="de-CH" dirty="0"/>
+              <a:t>Feedback</a:t>
+            </a:r>
+          </a:p>
+          <a:p>
+            <a:endParaRPr lang="en-US" dirty="0"/>
           </a:p>
         </p:txBody>
       </p:sp>

</xml_diff>

<commit_message>
add the proper pushpin for location
</commit_message>
<xml_diff>
--- a/Docs/Code Challenge.pptx
+++ b/Docs/Code Challenge.pptx
@@ -5298,7 +5298,7 @@
         <p:spPr>
           <a:xfrm>
             <a:off x="1858488" y="5379522"/>
-            <a:ext cx="8241476" cy="369332"/>
+            <a:ext cx="8241476" cy="646331"/>
           </a:xfrm>
           <a:prstGeom prst="rect">
             <a:avLst/>
@@ -5314,6 +5314,13 @@
             <a:r>
               <a:rPr lang="en-US" dirty="0"/>
               <a:t>Environment: Visual Studio 2022, WPF, MVVM, Entity Framework, MSSQL Server</a:t>
+            </a:r>
+            <a:br>
+              <a:rPr lang="en-US" dirty="0"/>
+            </a:br>
+            <a:r>
+              <a:rPr lang="en-US" dirty="0"/>
+              <a:t>Map and MVVM -&gt; DevExpress</a:t>
             </a:r>
             <a:endParaRPr lang="en-IN" dirty="0"/>
           </a:p>

</xml_diff>

<commit_message>
add and create the db
</commit_message>
<xml_diff>
--- a/Docs/Code Challenge.pptx
+++ b/Docs/Code Challenge.pptx
@@ -5,7 +5,7 @@
     <p:sldMasterId id="2147483660" r:id="rId1"/>
   </p:sldMasterIdLst>
   <p:notesMasterIdLst>
-    <p:notesMasterId r:id="rId8"/>
+    <p:notesMasterId r:id="rId9"/>
   </p:notesMasterIdLst>
   <p:sldIdLst>
     <p:sldId id="256" r:id="rId2"/>
@@ -13,7 +13,8 @@
     <p:sldId id="258" r:id="rId4"/>
     <p:sldId id="260" r:id="rId5"/>
     <p:sldId id="261" r:id="rId6"/>
-    <p:sldId id="259" r:id="rId7"/>
+    <p:sldId id="262" r:id="rId7"/>
+    <p:sldId id="259" r:id="rId8"/>
   </p:sldIdLst>
   <p:sldSz cx="12192000" cy="6858000"/>
   <p:notesSz cx="6858000" cy="9144000"/>
@@ -5701,6 +5702,42 @@
           </a:p>
         </p:txBody>
       </p:sp>
+      <p:sp>
+        <p:nvSpPr>
+          <p:cNvPr id="3" name="TextBox 2">
+            <a:extLst>
+              <a:ext uri="{FF2B5EF4-FFF2-40B4-BE49-F238E27FC236}">
+                <a16:creationId xmlns:a16="http://schemas.microsoft.com/office/drawing/2014/main" id="{1B9518B2-B67F-408B-8D78-1035B184D849}"/>
+              </a:ext>
+            </a:extLst>
+          </p:cNvPr>
+          <p:cNvSpPr txBox="1"/>
+          <p:nvPr/>
+        </p:nvSpPr>
+        <p:spPr>
+          <a:xfrm>
+            <a:off x="1858488" y="5379522"/>
+            <a:ext cx="8241476" cy="369332"/>
+          </a:xfrm>
+          <a:prstGeom prst="rect">
+            <a:avLst/>
+          </a:prstGeom>
+          <a:noFill/>
+        </p:spPr>
+        <p:txBody>
+          <a:bodyPr wrap="square" rtlCol="0">
+            <a:spAutoFit/>
+          </a:bodyPr>
+          <a:lstStyle/>
+          <a:p>
+            <a:r>
+              <a:rPr lang="en-US" dirty="0"/>
+              <a:t>Data Model: Code First approach</a:t>
+            </a:r>
+            <a:endParaRPr lang="en-IN" dirty="0"/>
+          </a:p>
+        </p:txBody>
+      </p:sp>
     </p:spTree>
     <p:extLst>
       <p:ext uri="{BB962C8B-B14F-4D97-AF65-F5344CB8AC3E}">
@@ -5733,6 +5770,268 @@
       </p:grpSpPr>
       <p:sp>
         <p:nvSpPr>
+          <p:cNvPr id="2" name="Title 1">
+            <a:extLst>
+              <a:ext uri="{FF2B5EF4-FFF2-40B4-BE49-F238E27FC236}">
+                <a16:creationId xmlns:a16="http://schemas.microsoft.com/office/drawing/2014/main" id="{C807BA46-61F7-A14B-E520-318A4C8F9060}"/>
+              </a:ext>
+            </a:extLst>
+          </p:cNvPr>
+          <p:cNvSpPr>
+            <a:spLocks noGrp="1"/>
+          </p:cNvSpPr>
+          <p:nvPr>
+            <p:ph type="title"/>
+          </p:nvPr>
+        </p:nvSpPr>
+        <p:spPr/>
+        <p:txBody>
+          <a:bodyPr/>
+          <a:lstStyle/>
+          <a:p>
+            <a:r>
+              <a:rPr lang="en-US" dirty="0"/>
+              <a:t>Status</a:t>
+            </a:r>
+            <a:endParaRPr lang="en-IN" dirty="0"/>
+          </a:p>
+        </p:txBody>
+      </p:sp>
+      <p:sp>
+        <p:nvSpPr>
+          <p:cNvPr id="3" name="Content Placeholder 2">
+            <a:extLst>
+              <a:ext uri="{FF2B5EF4-FFF2-40B4-BE49-F238E27FC236}">
+                <a16:creationId xmlns:a16="http://schemas.microsoft.com/office/drawing/2014/main" id="{E7387AEC-8FE4-1248-3473-968ADB25C2C4}"/>
+              </a:ext>
+            </a:extLst>
+          </p:cNvPr>
+          <p:cNvSpPr>
+            <a:spLocks noGrp="1"/>
+          </p:cNvSpPr>
+          <p:nvPr>
+            <p:ph idx="1"/>
+          </p:nvPr>
+        </p:nvSpPr>
+        <p:spPr/>
+        <p:txBody>
+          <a:bodyPr>
+            <a:normAutofit fontScale="85000" lnSpcReduction="20000"/>
+          </a:bodyPr>
+          <a:lstStyle/>
+          <a:p>
+            <a:r>
+              <a:rPr lang="en-US" dirty="0"/>
+              <a:t>Introduction</a:t>
+            </a:r>
+          </a:p>
+          <a:p>
+            <a:pPr lvl="1"/>
+            <a:r>
+              <a:rPr lang="en-US" dirty="0"/>
+              <a:t>Since time is money, priority has been given to time. Scope and tasks have to be splitted to find a solution within the given time. </a:t>
+            </a:r>
+          </a:p>
+          <a:p>
+            <a:r>
+              <a:rPr lang="en-US" dirty="0"/>
+              <a:t>Planning</a:t>
+            </a:r>
+          </a:p>
+          <a:p>
+            <a:pPr lvl="1"/>
+            <a:r>
+              <a:rPr lang="en-US" dirty="0"/>
+              <a:t>Concept, Architecture and Diagrams (approx. 30-40mins) </a:t>
+            </a:r>
+            <a:r>
+              <a:rPr lang="en-US" b="1" dirty="0"/>
+              <a:t>- done</a:t>
+            </a:r>
+          </a:p>
+          <a:p>
+            <a:pPr lvl="1"/>
+            <a:r>
+              <a:rPr lang="en-US" dirty="0"/>
+              <a:t>Soldier movements on map (basic) (approx. 2hrs) </a:t>
+            </a:r>
+            <a:r>
+              <a:rPr lang="en-US" b="1" dirty="0"/>
+              <a:t>- done</a:t>
+            </a:r>
+          </a:p>
+          <a:p>
+            <a:pPr lvl="2"/>
+            <a:r>
+              <a:rPr lang="en-US" dirty="0"/>
+              <a:t>Use basic properties (id, name &amp; location) </a:t>
+            </a:r>
+            <a:r>
+              <a:rPr lang="en-US" b="1" dirty="0"/>
+              <a:t>- done</a:t>
+            </a:r>
+            <a:endParaRPr lang="en-US" dirty="0"/>
+          </a:p>
+          <a:p>
+            <a:pPr lvl="2"/>
+            <a:r>
+              <a:rPr lang="en-US" dirty="0"/>
+              <a:t>Generate some fixed soldiers</a:t>
+            </a:r>
+            <a:r>
+              <a:rPr lang="en-US" b="1" dirty="0"/>
+              <a:t> - done</a:t>
+            </a:r>
+            <a:endParaRPr lang="en-US" dirty="0"/>
+          </a:p>
+          <a:p>
+            <a:pPr lvl="2"/>
+            <a:r>
+              <a:rPr lang="en-US" dirty="0"/>
+              <a:t>Display the movements on map</a:t>
+            </a:r>
+            <a:r>
+              <a:rPr lang="en-US" b="1" dirty="0"/>
+              <a:t> - done</a:t>
+            </a:r>
+            <a:endParaRPr lang="en-US" dirty="0"/>
+          </a:p>
+          <a:p>
+            <a:pPr lvl="2"/>
+            <a:r>
+              <a:rPr lang="en-US" dirty="0"/>
+              <a:t>Write unit tests</a:t>
+            </a:r>
+            <a:r>
+              <a:rPr lang="en-US" b="1" dirty="0"/>
+              <a:t> - done</a:t>
+            </a:r>
+            <a:endParaRPr lang="en-US" dirty="0"/>
+          </a:p>
+          <a:p>
+            <a:pPr lvl="1"/>
+            <a:r>
+              <a:rPr lang="en-US" dirty="0"/>
+              <a:t>Soldier movements on map (extended) (approx. 1.30hrs)</a:t>
+            </a:r>
+          </a:p>
+          <a:p>
+            <a:pPr lvl="2"/>
+            <a:r>
+              <a:rPr lang="en-US" dirty="0"/>
+              <a:t>Emulate the movements</a:t>
+            </a:r>
+            <a:r>
+              <a:rPr lang="en-US" b="1" dirty="0"/>
+              <a:t> - done</a:t>
+            </a:r>
+            <a:endParaRPr lang="en-US" dirty="0"/>
+          </a:p>
+          <a:p>
+            <a:pPr lvl="2"/>
+            <a:r>
+              <a:rPr lang="en-US" dirty="0"/>
+              <a:t>Save the movements in DB</a:t>
+            </a:r>
+          </a:p>
+          <a:p>
+            <a:pPr lvl="2"/>
+            <a:r>
+              <a:rPr lang="en-US" dirty="0"/>
+              <a:t>Display soldier info</a:t>
+            </a:r>
+          </a:p>
+          <a:p>
+            <a:pPr lvl="2"/>
+            <a:r>
+              <a:rPr lang="en-US" dirty="0"/>
+              <a:t>Integration Tests</a:t>
+            </a:r>
+          </a:p>
+          <a:p>
+            <a:pPr lvl="1"/>
+            <a:r>
+              <a:rPr lang="en-US" dirty="0"/>
+              <a:t>Soldier movements on map (final) (approx. 30mins)</a:t>
+            </a:r>
+          </a:p>
+          <a:p>
+            <a:pPr lvl="2"/>
+            <a:r>
+              <a:rPr lang="en-US" dirty="0"/>
+              <a:t>Add additional properties (training and so on)</a:t>
+            </a:r>
+          </a:p>
+          <a:p>
+            <a:pPr lvl="2"/>
+            <a:r>
+              <a:rPr lang="en-US" dirty="0"/>
+              <a:t>Optimizing and performance</a:t>
+            </a:r>
+          </a:p>
+        </p:txBody>
+      </p:sp>
+      <p:sp>
+        <p:nvSpPr>
+          <p:cNvPr id="4" name="Slide Number Placeholder 3">
+            <a:extLst>
+              <a:ext uri="{FF2B5EF4-FFF2-40B4-BE49-F238E27FC236}">
+                <a16:creationId xmlns:a16="http://schemas.microsoft.com/office/drawing/2014/main" id="{CFAF78D6-46D1-B2B8-36F4-B9C72374FB0A}"/>
+              </a:ext>
+            </a:extLst>
+          </p:cNvPr>
+          <p:cNvSpPr>
+            <a:spLocks noGrp="1"/>
+          </p:cNvSpPr>
+          <p:nvPr>
+            <p:ph type="sldNum" sz="quarter" idx="12"/>
+          </p:nvPr>
+        </p:nvSpPr>
+        <p:spPr/>
+        <p:txBody>
+          <a:bodyPr/>
+          <a:lstStyle/>
+          <a:p>
+            <a:fld id="{485A9664-C04A-438C-976D-1F037B1C7DF3}" type="slidenum">
+              <a:rPr lang="en-IN" smtClean="0"/>
+              <a:t>6</a:t>
+            </a:fld>
+            <a:endParaRPr lang="en-IN"/>
+          </a:p>
+        </p:txBody>
+      </p:sp>
+    </p:spTree>
+    <p:extLst>
+      <p:ext uri="{BB962C8B-B14F-4D97-AF65-F5344CB8AC3E}">
+        <p14:creationId xmlns:p14="http://schemas.microsoft.com/office/powerpoint/2010/main" val="1866519893"/>
+      </p:ext>
+    </p:extLst>
+  </p:cSld>
+  <p:clrMapOvr>
+    <a:masterClrMapping/>
+  </p:clrMapOvr>
+</p:sld>
+</file>
+
+<file path=ppt/slides/slide7.xml><?xml version="1.0" encoding="utf-8"?>
+<p:sld xmlns:a="http://schemas.openxmlformats.org/drawingml/2006/main" xmlns:r="http://schemas.openxmlformats.org/officeDocument/2006/relationships" xmlns:p="http://schemas.openxmlformats.org/presentationml/2006/main">
+  <p:cSld>
+    <p:spTree>
+      <p:nvGrpSpPr>
+        <p:cNvPr id="1" name=""/>
+        <p:cNvGrpSpPr/>
+        <p:nvPr/>
+      </p:nvGrpSpPr>
+      <p:grpSpPr>
+        <a:xfrm>
+          <a:off x="0" y="0"/>
+          <a:ext cx="0" cy="0"/>
+          <a:chOff x="0" y="0"/>
+          <a:chExt cx="0" cy="0"/>
+        </a:xfrm>
+      </p:grpSpPr>
+      <p:sp>
+        <p:nvSpPr>
           <p:cNvPr id="4" name="Slide Number Placeholder 3">
             <a:extLst>
               <a:ext uri="{FF2B5EF4-FFF2-40B4-BE49-F238E27FC236}">
@@ -5754,7 +6053,7 @@
           <a:p>
             <a:fld id="{485A9664-C04A-438C-976D-1F037B1C7DF3}" type="slidenum">
               <a:rPr lang="en-IN" smtClean="0"/>
-              <a:t>6</a:t>
+              <a:t>7</a:t>
             </a:fld>
             <a:endParaRPr lang="en-IN"/>
           </a:p>

</xml_diff>